<commit_message>
Update AboutUs portfolio link
</commit_message>
<xml_diff>
--- a/docs/diagrams/AddSortSequenceDiagram.pptx
+++ b/docs/diagrams/AddSortSequenceDiagram.pptx
@@ -3534,7 +3534,7 @@
         </p:nvSpPr>
         <p:spPr>
           <a:xfrm>
-            <a:off x="228600" y="306114"/>
+            <a:off x="163469" y="253144"/>
             <a:ext cx="9245293" cy="5637852"/>
           </a:xfrm>
           <a:prstGeom prst="roundRect">
@@ -3628,15 +3628,7 @@
                   <a:schemeClr val="bg1"/>
                 </a:solidFill>
               </a:rPr>
-              <a:t>:</a:t>
-            </a:r>
-            <a:r>
-              <a:rPr lang="en-US" sz="1600" dirty="0" err="1">
-                <a:solidFill>
-                  <a:schemeClr val="bg1"/>
-                </a:solidFill>
-              </a:rPr>
-              <a:t>LogicManager</a:t>
+              <a:t>:LogicManager</a:t>
             </a:r>
             <a:endParaRPr lang="en-SG" sz="1600" dirty="0">
               <a:solidFill>
@@ -3787,7 +3779,7 @@
           <a:p>
             <a:pPr algn="ctr"/>
             <a:r>
-              <a:rPr lang="en-US" sz="1600" dirty="0" err="1">
+              <a:rPr lang="en-US" sz="1600" dirty="0">
                 <a:solidFill>
                   <a:schemeClr val="bg1"/>
                 </a:solidFill>
@@ -4342,7 +4334,7 @@
           <a:p>
             <a:pPr algn="ctr"/>
             <a:r>
-              <a:rPr lang="en-US" sz="1600" dirty="0" err="1" smtClean="0">
+              <a:rPr lang="en-US" sz="1600" dirty="0" smtClean="0">
                 <a:solidFill>
                   <a:schemeClr val="bg1"/>
                 </a:solidFill>
@@ -4369,7 +4361,7 @@
         <p:spPr>
           <a:xfrm>
             <a:off x="7186441" y="2424586"/>
-            <a:ext cx="24246" cy="2909414"/>
+            <a:ext cx="28747" cy="3118964"/>
           </a:xfrm>
           <a:prstGeom prst="line">
             <a:avLst/>
@@ -4493,31 +4485,7 @@
                   <a:schemeClr val="bg1"/>
                 </a:solidFill>
               </a:rPr>
-              <a:t>:</a:t>
-            </a:r>
-            <a:r>
-              <a:rPr lang="en-US" sz="1600" dirty="0" err="1" smtClean="0">
-                <a:solidFill>
-                  <a:schemeClr val="bg1"/>
-                </a:solidFill>
-              </a:rPr>
-              <a:t>AddQuick</a:t>
-            </a:r>
-            <a:r>
-              <a:rPr lang="en-US" sz="1600" dirty="0" smtClean="0">
-                <a:solidFill>
-                  <a:schemeClr val="bg1"/>
-                </a:solidFill>
-              </a:rPr>
-              <a:t> </a:t>
-            </a:r>
-            <a:r>
-              <a:rPr lang="en-US" sz="1600" dirty="0" err="1" smtClean="0">
-                <a:solidFill>
-                  <a:schemeClr val="bg1"/>
-                </a:solidFill>
-              </a:rPr>
-              <a:t>CommandParser</a:t>
+              <a:t>:AddQuick CommandParser</a:t>
             </a:r>
             <a:endParaRPr lang="en-SG" sz="1600" dirty="0">
               <a:solidFill>
@@ -4841,7 +4809,7 @@
         </p:nvCxnSpPr>
         <p:spPr>
           <a:xfrm>
-            <a:off x="5988628" y="1844052"/>
+            <a:off x="6012376" y="1978382"/>
             <a:ext cx="686992" cy="0"/>
           </a:xfrm>
           <a:prstGeom prst="straightConnector1">
@@ -4915,7 +4883,7 @@
         </p:nvSpPr>
         <p:spPr>
           <a:xfrm flipH="1">
-            <a:off x="6119669" y="1624286"/>
+            <a:off x="6097836" y="1741033"/>
             <a:ext cx="680156" cy="261610"/>
           </a:xfrm>
           <a:prstGeom prst="rect">
@@ -5059,8 +5027,8 @@
         </p:nvSpPr>
         <p:spPr>
           <a:xfrm>
-            <a:off x="8408618" y="3253063"/>
-            <a:ext cx="234112" cy="547122"/>
+            <a:off x="8408618" y="3510193"/>
+            <a:ext cx="207436" cy="289991"/>
           </a:xfrm>
           <a:prstGeom prst="rect">
             <a:avLst/>
@@ -5107,9 +5075,9 @@
           <p:nvPr/>
         </p:nvCxnSpPr>
         <p:spPr>
-          <a:xfrm flipH="1">
-            <a:off x="8496149" y="3567065"/>
-            <a:ext cx="5314" cy="1665172"/>
+          <a:xfrm>
+            <a:off x="8512336" y="3267837"/>
+            <a:ext cx="18206" cy="2299586"/>
           </a:xfrm>
           <a:prstGeom prst="line">
             <a:avLst/>
@@ -5215,12 +5183,8 @@
           </a:lstStyle>
           <a:p>
             <a:r>
-              <a:rPr lang="en-US" sz="1100" dirty="0" err="1" smtClean="0"/>
-              <a:t>sortAllPersons</a:t>
-            </a:r>
-            <a:r>
               <a:rPr lang="en-US" sz="1100" dirty="0" smtClean="0"/>
-              <a:t>()</a:t>
+              <a:t>sortAllPersons()</a:t>
             </a:r>
             <a:endParaRPr lang="en-US" sz="1100" dirty="0"/>
           </a:p>
@@ -5234,7 +5198,7 @@
         </p:nvCxnSpPr>
         <p:spPr>
           <a:xfrm>
-            <a:off x="7261673" y="3727416"/>
+            <a:off x="7306940" y="3736472"/>
             <a:ext cx="1058462" cy="2612"/>
           </a:xfrm>
           <a:prstGeom prst="straightConnector1">
@@ -5427,12 +5391,8 @@
           </a:lstStyle>
           <a:p>
             <a:r>
-              <a:rPr lang="en-US" sz="1000" dirty="0" err="1" smtClean="0"/>
-              <a:t>filterImportantTag</a:t>
-            </a:r>
-            <a:r>
               <a:rPr lang="en-US" sz="1000" dirty="0" smtClean="0"/>
-              <a:t>()</a:t>
+              <a:t>filterImportantTag()</a:t>
             </a:r>
             <a:endParaRPr lang="en-US" sz="1000" dirty="0"/>
           </a:p>
@@ -5446,7 +5406,7 @@
         </p:nvSpPr>
         <p:spPr>
           <a:xfrm>
-            <a:off x="7016393" y="3358815"/>
+            <a:off x="7039093" y="3382528"/>
             <a:ext cx="1353343" cy="169277"/>
           </a:xfrm>
           <a:prstGeom prst="rect">
@@ -5472,12 +5432,8 @@
           </a:lstStyle>
           <a:p>
             <a:r>
-              <a:rPr lang="en-US" sz="1100" dirty="0" err="1" smtClean="0"/>
-              <a:t>addPerson</a:t>
-            </a:r>
-            <a:r>
               <a:rPr lang="en-US" sz="1100" dirty="0" smtClean="0"/>
-              <a:t>(</a:t>
+              <a:t>addPerson(</a:t>
             </a:r>
             <a:r>
               <a:rPr lang="en-US" sz="1100" dirty="0" err="1" smtClean="0"/>
@@ -5543,8 +5499,8 @@
         </p:nvCxnSpPr>
         <p:spPr>
           <a:xfrm>
-            <a:off x="7333974" y="4889956"/>
-            <a:ext cx="1058462" cy="2612"/>
+            <a:off x="7337262" y="4901823"/>
+            <a:ext cx="1065661" cy="3859"/>
           </a:xfrm>
           <a:prstGeom prst="straightConnector1">
             <a:avLst/>
@@ -5581,8 +5537,8 @@
         </p:nvSpPr>
         <p:spPr>
           <a:xfrm>
-            <a:off x="8425133" y="4702104"/>
-            <a:ext cx="200913" cy="312561"/>
+            <a:off x="8425133" y="4702105"/>
+            <a:ext cx="200913" cy="262660"/>
           </a:xfrm>
           <a:prstGeom prst="rect">
             <a:avLst/>

</xml_diff>